<commit_message>
4th Push - Approved
</commit_message>
<xml_diff>
--- a/INTROSE - Analysts.pptx
+++ b/INTROSE - Analysts.pptx
@@ -5882,7 +5882,7 @@
           <p:nvPr/>
         </p:nvGraphicFramePr>
         <p:xfrm>
-          <a:off x="293425" y="1146300"/>
+          <a:off x="314456" y="1088750"/>
           <a:ext cx="3000000" cy="3000000"/>
         </p:xfrm>
         <a:graphic>
@@ -5890,7 +5890,7 @@
             <a:tbl>
               <a:tblPr>
                 <a:noFill/>
-                <a:tableStyleId>{861C3BC6-D8B6-4C63-B97D-D87F8187C0AB}</a:tableStyleId>
+                <a:tableStyleId>{5A0F2968-D3B6-4090-8CE5-033CB1162199}</a:tableStyleId>
               </a:tblPr>
               <a:tblGrid>
                 <a:gridCol w="2128775"/>
@@ -7491,7 +7491,7 @@
             </a:pPr>
             <a:r>
               <a:rPr lang="en" sz="2400"/>
-              <a:t>They need a computing solution to make it easier for the users to check and track their inventories and orders instead of using different excel files. This will help them save a lot of time and confusions in counting the orders per day.</a:t>
+              <a:t>They need a computing solution to make it easier for the users to check and track their inventories and orders instead of using different excel files. This will help them save a lot of time and avoid confusions in counting the orders per day.</a:t>
             </a:r>
           </a:p>
         </p:txBody>

</xml_diff>